<commit_message>
Included few pdf books wich will be used for the homeworks
</commit_message>
<xml_diff>
--- a/Explain the chapters.pptx
+++ b/Explain the chapters.pptx
@@ -214,7 +214,7 @@
           <a:p>
             <a:fld id="{6AB46F23-02EF-4704-88F9-474644CC3FEE}" type="datetimeFigureOut">
               <a:rPr lang="en-US" smtClean="0"/>
-              <a:t>12-Mar-17</a:t>
+              <a:t>14-Mar-17</a:t>
             </a:fld>
             <a:endParaRPr lang="en-US"/>
           </a:p>
@@ -309,7 +309,6 @@
               <a:rPr lang="en-US"/>
               <a:t>Fifth level</a:t>
             </a:r>
-            <a:endParaRPr lang="en-US"/>
           </a:p>
         </p:txBody>
       </p:sp>
@@ -526,7 +525,7 @@
           <a:bodyPr/>
           <a:lstStyle/>
           <a:p>
-            <a:endParaRPr lang="en-US"/>
+            <a:endParaRPr lang="en-US" dirty="0"/>
           </a:p>
         </p:txBody>
       </p:sp>
@@ -547,6 +546,90 @@
           <a:p>
             <a:fld id="{6EF0A342-33DD-45BC-B6B0-C043583FFD70}" type="slidenum">
               <a:rPr lang="en-US" smtClean="0"/>
+              <a:t>1</a:t>
+            </a:fld>
+            <a:endParaRPr lang="en-US"/>
+          </a:p>
+        </p:txBody>
+      </p:sp>
+    </p:spTree>
+    <p:extLst>
+      <p:ext uri="{BB962C8B-B14F-4D97-AF65-F5344CB8AC3E}">
+        <p14:creationId xmlns:p14="http://schemas.microsoft.com/office/powerpoint/2010/main" val="3580878427"/>
+      </p:ext>
+    </p:extLst>
+  </p:cSld>
+  <p:clrMapOvr>
+    <a:masterClrMapping/>
+  </p:clrMapOvr>
+</p:notes>
+</file>
+
+<file path=ppt/notesSlides/notesSlide2.xml><?xml version="1.0" encoding="utf-8"?>
+<p:notes xmlns:a="http://schemas.openxmlformats.org/drawingml/2006/main" xmlns:r="http://schemas.openxmlformats.org/officeDocument/2006/relationships" xmlns:p="http://schemas.openxmlformats.org/presentationml/2006/main">
+  <p:cSld>
+    <p:spTree>
+      <p:nvGrpSpPr>
+        <p:cNvPr id="1" name=""/>
+        <p:cNvGrpSpPr/>
+        <p:nvPr/>
+      </p:nvGrpSpPr>
+      <p:grpSpPr>
+        <a:xfrm>
+          <a:off x="0" y="0"/>
+          <a:ext cx="0" cy="0"/>
+          <a:chOff x="0" y="0"/>
+          <a:chExt cx="0" cy="0"/>
+        </a:xfrm>
+      </p:grpSpPr>
+      <p:sp>
+        <p:nvSpPr>
+          <p:cNvPr id="2" name="Slide Image Placeholder 1"/>
+          <p:cNvSpPr>
+            <a:spLocks noGrp="1" noRot="1" noChangeAspect="1"/>
+          </p:cNvSpPr>
+          <p:nvPr>
+            <p:ph type="sldImg"/>
+          </p:nvPr>
+        </p:nvSpPr>
+        <p:spPr/>
+      </p:sp>
+      <p:sp>
+        <p:nvSpPr>
+          <p:cNvPr id="3" name="Notes Placeholder 2"/>
+          <p:cNvSpPr>
+            <a:spLocks noGrp="1"/>
+          </p:cNvSpPr>
+          <p:nvPr>
+            <p:ph type="body" idx="1"/>
+          </p:nvPr>
+        </p:nvSpPr>
+        <p:spPr/>
+        <p:txBody>
+          <a:bodyPr/>
+          <a:lstStyle/>
+          <a:p>
+            <a:endParaRPr lang="en-US"/>
+          </a:p>
+        </p:txBody>
+      </p:sp>
+      <p:sp>
+        <p:nvSpPr>
+          <p:cNvPr id="4" name="Slide Number Placeholder 3"/>
+          <p:cNvSpPr>
+            <a:spLocks noGrp="1"/>
+          </p:cNvSpPr>
+          <p:nvPr>
+            <p:ph type="sldNum" sz="quarter" idx="10"/>
+          </p:nvPr>
+        </p:nvSpPr>
+        <p:spPr/>
+        <p:txBody>
+          <a:bodyPr/>
+          <a:lstStyle/>
+          <a:p>
+            <a:fld id="{6EF0A342-33DD-45BC-B6B0-C043583FFD70}" type="slidenum">
+              <a:rPr lang="en-US" smtClean="0"/>
               <a:t>2</a:t>
             </a:fld>
             <a:endParaRPr lang="en-US"/>
@@ -557,6 +640,90 @@
     <p:extLst>
       <p:ext uri="{BB962C8B-B14F-4D97-AF65-F5344CB8AC3E}">
         <p14:creationId xmlns:p14="http://schemas.microsoft.com/office/powerpoint/2010/main" val="4264535852"/>
+      </p:ext>
+    </p:extLst>
+  </p:cSld>
+  <p:clrMapOvr>
+    <a:masterClrMapping/>
+  </p:clrMapOvr>
+</p:notes>
+</file>
+
+<file path=ppt/notesSlides/notesSlide3.xml><?xml version="1.0" encoding="utf-8"?>
+<p:notes xmlns:a="http://schemas.openxmlformats.org/drawingml/2006/main" xmlns:r="http://schemas.openxmlformats.org/officeDocument/2006/relationships" xmlns:p="http://schemas.openxmlformats.org/presentationml/2006/main">
+  <p:cSld>
+    <p:spTree>
+      <p:nvGrpSpPr>
+        <p:cNvPr id="1" name=""/>
+        <p:cNvGrpSpPr/>
+        <p:nvPr/>
+      </p:nvGrpSpPr>
+      <p:grpSpPr>
+        <a:xfrm>
+          <a:off x="0" y="0"/>
+          <a:ext cx="0" cy="0"/>
+          <a:chOff x="0" y="0"/>
+          <a:chExt cx="0" cy="0"/>
+        </a:xfrm>
+      </p:grpSpPr>
+      <p:sp>
+        <p:nvSpPr>
+          <p:cNvPr id="2" name="Slide Image Placeholder 1"/>
+          <p:cNvSpPr>
+            <a:spLocks noGrp="1" noRot="1" noChangeAspect="1"/>
+          </p:cNvSpPr>
+          <p:nvPr>
+            <p:ph type="sldImg"/>
+          </p:nvPr>
+        </p:nvSpPr>
+        <p:spPr/>
+      </p:sp>
+      <p:sp>
+        <p:nvSpPr>
+          <p:cNvPr id="3" name="Notes Placeholder 2"/>
+          <p:cNvSpPr>
+            <a:spLocks noGrp="1"/>
+          </p:cNvSpPr>
+          <p:nvPr>
+            <p:ph type="body" idx="1"/>
+          </p:nvPr>
+        </p:nvSpPr>
+        <p:spPr/>
+        <p:txBody>
+          <a:bodyPr/>
+          <a:lstStyle/>
+          <a:p>
+            <a:endParaRPr lang="en-US" dirty="0"/>
+          </a:p>
+        </p:txBody>
+      </p:sp>
+      <p:sp>
+        <p:nvSpPr>
+          <p:cNvPr id="4" name="Slide Number Placeholder 3"/>
+          <p:cNvSpPr>
+            <a:spLocks noGrp="1"/>
+          </p:cNvSpPr>
+          <p:nvPr>
+            <p:ph type="sldNum" sz="quarter" idx="10"/>
+          </p:nvPr>
+        </p:nvSpPr>
+        <p:spPr/>
+        <p:txBody>
+          <a:bodyPr/>
+          <a:lstStyle/>
+          <a:p>
+            <a:fld id="{6EF0A342-33DD-45BC-B6B0-C043583FFD70}" type="slidenum">
+              <a:rPr lang="en-US" smtClean="0"/>
+              <a:t>3</a:t>
+            </a:fld>
+            <a:endParaRPr lang="en-US"/>
+          </a:p>
+        </p:txBody>
+      </p:sp>
+    </p:spTree>
+    <p:extLst>
+      <p:ext uri="{BB962C8B-B14F-4D97-AF65-F5344CB8AC3E}">
+        <p14:creationId xmlns:p14="http://schemas.microsoft.com/office/powerpoint/2010/main" val="1244387321"/>
       </p:ext>
     </p:extLst>
   </p:cSld>
@@ -616,7 +783,7 @@
           <a:noFill/>
           <a:extLst>
             <a:ext uri="{909E8E84-426E-40dd-AFC4-6F175D3DCCD1}">
-              <a14:hiddenFill xmlns:a14="http://schemas.microsoft.com/office/drawing/2010/main" xmlns="">
+              <a14:hiddenFill xmlns="" xmlns:a14="http://schemas.microsoft.com/office/drawing/2010/main">
                 <a:solidFill>
                   <a:srgbClr val="FFFFFF"/>
                 </a:solidFill>
@@ -676,7 +843,7 @@
             </a:ln>
             <a:extLst>
               <a:ext uri="{91240B29-F687-4f45-9708-019B960494DF}">
-                <a14:hiddenLine xmlns:a14="http://schemas.microsoft.com/office/drawing/2010/main" xmlns="" w="9525">
+                <a14:hiddenLine xmlns="" xmlns:a14="http://schemas.microsoft.com/office/drawing/2010/main" w="9525">
                   <a:solidFill>
                     <a:srgbClr val="000000"/>
                   </a:solidFill>
@@ -766,7 +933,7 @@
             </a:ln>
             <a:extLst>
               <a:ext uri="{91240B29-F687-4f45-9708-019B960494DF}">
-                <a14:hiddenLine xmlns:a14="http://schemas.microsoft.com/office/drawing/2010/main" xmlns="" w="9525">
+                <a14:hiddenLine xmlns="" xmlns:a14="http://schemas.microsoft.com/office/drawing/2010/main" w="9525">
                   <a:solidFill>
                     <a:srgbClr val="000000"/>
                   </a:solidFill>
@@ -856,7 +1023,7 @@
             </a:ln>
             <a:extLst>
               <a:ext uri="{91240B29-F687-4f45-9708-019B960494DF}">
-                <a14:hiddenLine xmlns:a14="http://schemas.microsoft.com/office/drawing/2010/main" xmlns="" w="9525">
+                <a14:hiddenLine xmlns="" xmlns:a14="http://schemas.microsoft.com/office/drawing/2010/main" w="9525">
                   <a:solidFill>
                     <a:srgbClr val="000000"/>
                   </a:solidFill>
@@ -890,7 +1057,7 @@
             </a:ln>
             <a:extLst>
               <a:ext uri="{91240B29-F687-4f45-9708-019B960494DF}">
-                <a14:hiddenLine xmlns:a14="http://schemas.microsoft.com/office/drawing/2010/main" xmlns="" w="9525">
+                <a14:hiddenLine xmlns="" xmlns:a14="http://schemas.microsoft.com/office/drawing/2010/main" w="9525">
                   <a:solidFill>
                     <a:srgbClr val="000000"/>
                   </a:solidFill>
@@ -980,7 +1147,7 @@
             </a:ln>
             <a:extLst>
               <a:ext uri="{91240B29-F687-4f45-9708-019B960494DF}">
-                <a14:hiddenLine xmlns:a14="http://schemas.microsoft.com/office/drawing/2010/main" xmlns="" w="9525">
+                <a14:hiddenLine xmlns="" xmlns:a14="http://schemas.microsoft.com/office/drawing/2010/main" w="9525">
                   <a:solidFill>
                     <a:srgbClr val="000000"/>
                   </a:solidFill>
@@ -1042,7 +1209,7 @@
             </a:ln>
             <a:extLst>
               <a:ext uri="{91240B29-F687-4f45-9708-019B960494DF}">
-                <a14:hiddenLine xmlns:a14="http://schemas.microsoft.com/office/drawing/2010/main" xmlns="" w="9525">
+                <a14:hiddenLine xmlns="" xmlns:a14="http://schemas.microsoft.com/office/drawing/2010/main" w="9525">
                   <a:solidFill>
                     <a:srgbClr val="000000"/>
                   </a:solidFill>
@@ -1104,7 +1271,7 @@
             </a:ln>
             <a:extLst>
               <a:ext uri="{91240B29-F687-4f45-9708-019B960494DF}">
-                <a14:hiddenLine xmlns:a14="http://schemas.microsoft.com/office/drawing/2010/main" xmlns="" w="9525">
+                <a14:hiddenLine xmlns="" xmlns:a14="http://schemas.microsoft.com/office/drawing/2010/main" w="9525">
                   <a:solidFill>
                     <a:srgbClr val="000000"/>
                   </a:solidFill>
@@ -1194,7 +1361,7 @@
             </a:ln>
             <a:extLst>
               <a:ext uri="{91240B29-F687-4f45-9708-019B960494DF}">
-                <a14:hiddenLine xmlns:a14="http://schemas.microsoft.com/office/drawing/2010/main" xmlns="" w="9525">
+                <a14:hiddenLine xmlns="" xmlns:a14="http://schemas.microsoft.com/office/drawing/2010/main" w="9525">
                   <a:solidFill>
                     <a:srgbClr val="000000"/>
                   </a:solidFill>
@@ -1256,7 +1423,7 @@
             </a:ln>
             <a:extLst>
               <a:ext uri="{91240B29-F687-4f45-9708-019B960494DF}">
-                <a14:hiddenLine xmlns:a14="http://schemas.microsoft.com/office/drawing/2010/main" xmlns="" w="9525">
+                <a14:hiddenLine xmlns="" xmlns:a14="http://schemas.microsoft.com/office/drawing/2010/main" w="9525">
                   <a:solidFill>
                     <a:srgbClr val="000000"/>
                   </a:solidFill>
@@ -1318,7 +1485,7 @@
             </a:ln>
             <a:extLst>
               <a:ext uri="{91240B29-F687-4f45-9708-019B960494DF}">
-                <a14:hiddenLine xmlns:a14="http://schemas.microsoft.com/office/drawing/2010/main" xmlns="" w="9525">
+                <a14:hiddenLine xmlns="" xmlns:a14="http://schemas.microsoft.com/office/drawing/2010/main" w="9525">
                   <a:solidFill>
                     <a:srgbClr val="000000"/>
                   </a:solidFill>
@@ -1408,7 +1575,7 @@
             </a:ln>
             <a:extLst>
               <a:ext uri="{91240B29-F687-4f45-9708-019B960494DF}">
-                <a14:hiddenLine xmlns:a14="http://schemas.microsoft.com/office/drawing/2010/main" xmlns="" w="9525">
+                <a14:hiddenLine xmlns="" xmlns:a14="http://schemas.microsoft.com/office/drawing/2010/main" w="9525">
                   <a:solidFill>
                     <a:srgbClr val="000000"/>
                   </a:solidFill>
@@ -1498,7 +1665,7 @@
             </a:ln>
             <a:extLst>
               <a:ext uri="{91240B29-F687-4f45-9708-019B960494DF}">
-                <a14:hiddenLine xmlns:a14="http://schemas.microsoft.com/office/drawing/2010/main" xmlns="" w="9525">
+                <a14:hiddenLine xmlns="" xmlns:a14="http://schemas.microsoft.com/office/drawing/2010/main" w="9525">
                   <a:solidFill>
                     <a:srgbClr val="000000"/>
                   </a:solidFill>
@@ -1560,7 +1727,7 @@
             </a:ln>
             <a:extLst>
               <a:ext uri="{91240B29-F687-4f45-9708-019B960494DF}">
-                <a14:hiddenLine xmlns:a14="http://schemas.microsoft.com/office/drawing/2010/main" xmlns="" w="9525">
+                <a14:hiddenLine xmlns="" xmlns:a14="http://schemas.microsoft.com/office/drawing/2010/main" w="9525">
                   <a:solidFill>
                     <a:srgbClr val="000000"/>
                   </a:solidFill>
@@ -1670,7 +1837,7 @@
             </a:ln>
             <a:extLst>
               <a:ext uri="{91240B29-F687-4f45-9708-019B960494DF}">
-                <a14:hiddenLine xmlns:a14="http://schemas.microsoft.com/office/drawing/2010/main" xmlns="" w="9525">
+                <a14:hiddenLine xmlns="" xmlns:a14="http://schemas.microsoft.com/office/drawing/2010/main" w="9525">
                   <a:solidFill>
                     <a:srgbClr val="000000"/>
                   </a:solidFill>
@@ -1732,7 +1899,7 @@
             </a:ln>
             <a:extLst>
               <a:ext uri="{91240B29-F687-4f45-9708-019B960494DF}">
-                <a14:hiddenLine xmlns:a14="http://schemas.microsoft.com/office/drawing/2010/main" xmlns="" w="9525">
+                <a14:hiddenLine xmlns="" xmlns:a14="http://schemas.microsoft.com/office/drawing/2010/main" w="9525">
                   <a:solidFill>
                     <a:srgbClr val="000000"/>
                   </a:solidFill>
@@ -1822,7 +1989,7 @@
             </a:ln>
             <a:extLst>
               <a:ext uri="{91240B29-F687-4f45-9708-019B960494DF}">
-                <a14:hiddenLine xmlns:a14="http://schemas.microsoft.com/office/drawing/2010/main" xmlns="" w="9525">
+                <a14:hiddenLine xmlns="" xmlns:a14="http://schemas.microsoft.com/office/drawing/2010/main" w="9525">
                   <a:solidFill>
                     <a:srgbClr val="000000"/>
                   </a:solidFill>
@@ -1912,7 +2079,7 @@
             </a:ln>
             <a:extLst>
               <a:ext uri="{91240B29-F687-4f45-9708-019B960494DF}">
-                <a14:hiddenLine xmlns:a14="http://schemas.microsoft.com/office/drawing/2010/main" xmlns="" w="9525">
+                <a14:hiddenLine xmlns="" xmlns:a14="http://schemas.microsoft.com/office/drawing/2010/main" w="9525">
                   <a:solidFill>
                     <a:srgbClr val="000000"/>
                   </a:solidFill>
@@ -1974,7 +2141,7 @@
             </a:ln>
             <a:extLst>
               <a:ext uri="{91240B29-F687-4f45-9708-019B960494DF}">
-                <a14:hiddenLine xmlns:a14="http://schemas.microsoft.com/office/drawing/2010/main" xmlns="" w="9525">
+                <a14:hiddenLine xmlns="" xmlns:a14="http://schemas.microsoft.com/office/drawing/2010/main" w="9525">
                   <a:solidFill>
                     <a:srgbClr val="000000"/>
                   </a:solidFill>
@@ -2064,7 +2231,7 @@
             </a:ln>
             <a:extLst>
               <a:ext uri="{91240B29-F687-4f45-9708-019B960494DF}">
-                <a14:hiddenLine xmlns:a14="http://schemas.microsoft.com/office/drawing/2010/main" xmlns="" w="9525">
+                <a14:hiddenLine xmlns="" xmlns:a14="http://schemas.microsoft.com/office/drawing/2010/main" w="9525">
                   <a:solidFill>
                     <a:srgbClr val="000000"/>
                   </a:solidFill>
@@ -2154,7 +2321,7 @@
             </a:ln>
             <a:extLst>
               <a:ext uri="{91240B29-F687-4f45-9708-019B960494DF}">
-                <a14:hiddenLine xmlns:a14="http://schemas.microsoft.com/office/drawing/2010/main" xmlns="" w="9525">
+                <a14:hiddenLine xmlns="" xmlns:a14="http://schemas.microsoft.com/office/drawing/2010/main" w="9525">
                   <a:solidFill>
                     <a:srgbClr val="000000"/>
                   </a:solidFill>
@@ -2210,7 +2377,7 @@
             </a:ln>
             <a:extLst>
               <a:ext uri="{91240B29-F687-4f45-9708-019B960494DF}">
-                <a14:hiddenLine xmlns:a14="http://schemas.microsoft.com/office/drawing/2010/main" xmlns="" w="9525">
+                <a14:hiddenLine xmlns="" xmlns:a14="http://schemas.microsoft.com/office/drawing/2010/main" w="9525">
                   <a:solidFill>
                     <a:srgbClr val="000000"/>
                   </a:solidFill>
@@ -2300,7 +2467,7 @@
             </a:ln>
             <a:extLst>
               <a:ext uri="{91240B29-F687-4f45-9708-019B960494DF}">
-                <a14:hiddenLine xmlns:a14="http://schemas.microsoft.com/office/drawing/2010/main" xmlns="" w="9525">
+                <a14:hiddenLine xmlns="" xmlns:a14="http://schemas.microsoft.com/office/drawing/2010/main" w="9525">
                   <a:solidFill>
                     <a:srgbClr val="000000"/>
                   </a:solidFill>
@@ -2356,7 +2523,7 @@
             </a:ln>
             <a:extLst>
               <a:ext uri="{91240B29-F687-4f45-9708-019B960494DF}">
-                <a14:hiddenLine xmlns:a14="http://schemas.microsoft.com/office/drawing/2010/main" xmlns="" w="9525">
+                <a14:hiddenLine xmlns="" xmlns:a14="http://schemas.microsoft.com/office/drawing/2010/main" w="9525">
                   <a:solidFill>
                     <a:srgbClr val="000000"/>
                   </a:solidFill>
@@ -2446,7 +2613,7 @@
             </a:ln>
             <a:extLst>
               <a:ext uri="{91240B29-F687-4f45-9708-019B960494DF}">
-                <a14:hiddenLine xmlns:a14="http://schemas.microsoft.com/office/drawing/2010/main" xmlns="" w="9525">
+                <a14:hiddenLine xmlns="" xmlns:a14="http://schemas.microsoft.com/office/drawing/2010/main" w="9525">
                   <a:solidFill>
                     <a:srgbClr val="000000"/>
                   </a:solidFill>
@@ -2514,7 +2681,7 @@
             </a:ln>
             <a:extLst>
               <a:ext uri="{91240B29-F687-4f45-9708-019B960494DF}">
-                <a14:hiddenLine xmlns:a14="http://schemas.microsoft.com/office/drawing/2010/main" xmlns="" w="9525">
+                <a14:hiddenLine xmlns="" xmlns:a14="http://schemas.microsoft.com/office/drawing/2010/main" w="9525">
                   <a:solidFill>
                     <a:srgbClr val="000000"/>
                   </a:solidFill>
@@ -2604,7 +2771,7 @@
             </a:ln>
             <a:extLst>
               <a:ext uri="{91240B29-F687-4f45-9708-019B960494DF}">
-                <a14:hiddenLine xmlns:a14="http://schemas.microsoft.com/office/drawing/2010/main" xmlns="" w="9525">
+                <a14:hiddenLine xmlns="" xmlns:a14="http://schemas.microsoft.com/office/drawing/2010/main" w="9525">
                   <a:solidFill>
                     <a:srgbClr val="000000"/>
                   </a:solidFill>
@@ -2672,7 +2839,7 @@
             </a:ln>
             <a:extLst>
               <a:ext uri="{91240B29-F687-4f45-9708-019B960494DF}">
-                <a14:hiddenLine xmlns:a14="http://schemas.microsoft.com/office/drawing/2010/main" xmlns="" w="9525">
+                <a14:hiddenLine xmlns="" xmlns:a14="http://schemas.microsoft.com/office/drawing/2010/main" w="9525">
                   <a:solidFill>
                     <a:srgbClr val="000000"/>
                   </a:solidFill>
@@ -2762,7 +2929,7 @@
             </a:ln>
             <a:extLst>
               <a:ext uri="{91240B29-F687-4f45-9708-019B960494DF}">
-                <a14:hiddenLine xmlns:a14="http://schemas.microsoft.com/office/drawing/2010/main" xmlns="" w="9525">
+                <a14:hiddenLine xmlns="" xmlns:a14="http://schemas.microsoft.com/office/drawing/2010/main" w="9525">
                   <a:solidFill>
                     <a:srgbClr val="000000"/>
                   </a:solidFill>
@@ -2796,7 +2963,7 @@
             </a:ln>
             <a:extLst>
               <a:ext uri="{91240B29-F687-4f45-9708-019B960494DF}">
-                <a14:hiddenLine xmlns:a14="http://schemas.microsoft.com/office/drawing/2010/main" xmlns="" w="9525">
+                <a14:hiddenLine xmlns="" xmlns:a14="http://schemas.microsoft.com/office/drawing/2010/main" w="9525">
                   <a:solidFill>
                     <a:srgbClr val="000000"/>
                   </a:solidFill>
@@ -2886,7 +3053,7 @@
             </a:ln>
             <a:extLst>
               <a:ext uri="{91240B29-F687-4f45-9708-019B960494DF}">
-                <a14:hiddenLine xmlns:a14="http://schemas.microsoft.com/office/drawing/2010/main" xmlns="" w="9525">
+                <a14:hiddenLine xmlns="" xmlns:a14="http://schemas.microsoft.com/office/drawing/2010/main" w="9525">
                   <a:solidFill>
                     <a:srgbClr val="000000"/>
                   </a:solidFill>
@@ -2948,7 +3115,7 @@
             </a:ln>
             <a:extLst>
               <a:ext uri="{91240B29-F687-4f45-9708-019B960494DF}">
-                <a14:hiddenLine xmlns:a14="http://schemas.microsoft.com/office/drawing/2010/main" xmlns="" w="9525">
+                <a14:hiddenLine xmlns="" xmlns:a14="http://schemas.microsoft.com/office/drawing/2010/main" w="9525">
                   <a:solidFill>
                     <a:srgbClr val="000000"/>
                   </a:solidFill>
@@ -3010,7 +3177,7 @@
             </a:ln>
             <a:extLst>
               <a:ext uri="{91240B29-F687-4f45-9708-019B960494DF}">
-                <a14:hiddenLine xmlns:a14="http://schemas.microsoft.com/office/drawing/2010/main" xmlns="" w="9525">
+                <a14:hiddenLine xmlns="" xmlns:a14="http://schemas.microsoft.com/office/drawing/2010/main" w="9525">
                   <a:solidFill>
                     <a:srgbClr val="000000"/>
                   </a:solidFill>
@@ -3100,7 +3267,7 @@
             </a:ln>
             <a:extLst>
               <a:ext uri="{91240B29-F687-4f45-9708-019B960494DF}">
-                <a14:hiddenLine xmlns:a14="http://schemas.microsoft.com/office/drawing/2010/main" xmlns="" w="9525">
+                <a14:hiddenLine xmlns="" xmlns:a14="http://schemas.microsoft.com/office/drawing/2010/main" w="9525">
                   <a:solidFill>
                     <a:srgbClr val="000000"/>
                   </a:solidFill>
@@ -3168,7 +3335,7 @@
             </a:ln>
             <a:extLst>
               <a:ext uri="{91240B29-F687-4f45-9708-019B960494DF}">
-                <a14:hiddenLine xmlns:a14="http://schemas.microsoft.com/office/drawing/2010/main" xmlns="" w="9525">
+                <a14:hiddenLine xmlns="" xmlns:a14="http://schemas.microsoft.com/office/drawing/2010/main" w="9525">
                   <a:solidFill>
                     <a:srgbClr val="000000"/>
                   </a:solidFill>
@@ -3230,7 +3397,7 @@
             </a:ln>
             <a:extLst>
               <a:ext uri="{91240B29-F687-4f45-9708-019B960494DF}">
-                <a14:hiddenLine xmlns:a14="http://schemas.microsoft.com/office/drawing/2010/main" xmlns="" w="9525">
+                <a14:hiddenLine xmlns="" xmlns:a14="http://schemas.microsoft.com/office/drawing/2010/main" w="9525">
                   <a:solidFill>
                     <a:srgbClr val="000000"/>
                   </a:solidFill>
@@ -3320,7 +3487,7 @@
             </a:ln>
             <a:extLst>
               <a:ext uri="{91240B29-F687-4f45-9708-019B960494DF}">
-                <a14:hiddenLine xmlns:a14="http://schemas.microsoft.com/office/drawing/2010/main" xmlns="" w="9525">
+                <a14:hiddenLine xmlns="" xmlns:a14="http://schemas.microsoft.com/office/drawing/2010/main" w="9525">
                   <a:solidFill>
                     <a:srgbClr val="000000"/>
                   </a:solidFill>
@@ -3382,7 +3549,7 @@
             </a:ln>
             <a:extLst>
               <a:ext uri="{91240B29-F687-4f45-9708-019B960494DF}">
-                <a14:hiddenLine xmlns:a14="http://schemas.microsoft.com/office/drawing/2010/main" xmlns="" w="9525">
+                <a14:hiddenLine xmlns="" xmlns:a14="http://schemas.microsoft.com/office/drawing/2010/main" w="9525">
                   <a:solidFill>
                     <a:srgbClr val="000000"/>
                   </a:solidFill>
@@ -3472,7 +3639,7 @@
             </a:ln>
             <a:extLst>
               <a:ext uri="{91240B29-F687-4f45-9708-019B960494DF}">
-                <a14:hiddenLine xmlns:a14="http://schemas.microsoft.com/office/drawing/2010/main" xmlns="" w="9525">
+                <a14:hiddenLine xmlns="" xmlns:a14="http://schemas.microsoft.com/office/drawing/2010/main" w="9525">
                   <a:solidFill>
                     <a:srgbClr val="000000"/>
                   </a:solidFill>
@@ -3534,7 +3701,7 @@
             </a:ln>
             <a:extLst>
               <a:ext uri="{91240B29-F687-4f45-9708-019B960494DF}">
-                <a14:hiddenLine xmlns:a14="http://schemas.microsoft.com/office/drawing/2010/main" xmlns="" w="9525">
+                <a14:hiddenLine xmlns="" xmlns:a14="http://schemas.microsoft.com/office/drawing/2010/main" w="9525">
                   <a:solidFill>
                     <a:srgbClr val="000000"/>
                   </a:solidFill>
@@ -3624,7 +3791,7 @@
             </a:ln>
             <a:extLst>
               <a:ext uri="{91240B29-F687-4f45-9708-019B960494DF}">
-                <a14:hiddenLine xmlns:a14="http://schemas.microsoft.com/office/drawing/2010/main" xmlns="" w="9525">
+                <a14:hiddenLine xmlns="" xmlns:a14="http://schemas.microsoft.com/office/drawing/2010/main" w="9525">
                   <a:solidFill>
                     <a:srgbClr val="000000"/>
                   </a:solidFill>
@@ -3658,7 +3825,7 @@
             </a:ln>
             <a:extLst>
               <a:ext uri="{91240B29-F687-4f45-9708-019B960494DF}">
-                <a14:hiddenLine xmlns:a14="http://schemas.microsoft.com/office/drawing/2010/main" xmlns="" w="9525">
+                <a14:hiddenLine xmlns="" xmlns:a14="http://schemas.microsoft.com/office/drawing/2010/main" w="9525">
                   <a:solidFill>
                     <a:srgbClr val="000000"/>
                   </a:solidFill>
@@ -3723,7 +3890,7 @@
             </a:ln>
             <a:extLst>
               <a:ext uri="{91240B29-F687-4f45-9708-019B960494DF}">
-                <a14:hiddenLine xmlns:a14="http://schemas.microsoft.com/office/drawing/2010/main" xmlns="" w="9525">
+                <a14:hiddenLine xmlns="" xmlns:a14="http://schemas.microsoft.com/office/drawing/2010/main" w="9525">
                   <a:solidFill>
                     <a:srgbClr val="000000"/>
                   </a:solidFill>
@@ -3813,7 +3980,7 @@
             </a:ln>
             <a:extLst>
               <a:ext uri="{91240B29-F687-4f45-9708-019B960494DF}">
-                <a14:hiddenLine xmlns:a14="http://schemas.microsoft.com/office/drawing/2010/main" xmlns="" w="9525">
+                <a14:hiddenLine xmlns="" xmlns:a14="http://schemas.microsoft.com/office/drawing/2010/main" w="9525">
                   <a:solidFill>
                     <a:srgbClr val="000000"/>
                   </a:solidFill>
@@ -3875,7 +4042,7 @@
             </a:ln>
             <a:extLst>
               <a:ext uri="{91240B29-F687-4f45-9708-019B960494DF}">
-                <a14:hiddenLine xmlns:a14="http://schemas.microsoft.com/office/drawing/2010/main" xmlns="" w="9525">
+                <a14:hiddenLine xmlns="" xmlns:a14="http://schemas.microsoft.com/office/drawing/2010/main" w="9525">
                   <a:solidFill>
                     <a:srgbClr val="000000"/>
                   </a:solidFill>
@@ -3965,7 +4132,7 @@
             </a:ln>
             <a:extLst>
               <a:ext uri="{91240B29-F687-4f45-9708-019B960494DF}">
-                <a14:hiddenLine xmlns:a14="http://schemas.microsoft.com/office/drawing/2010/main" xmlns="" w="9525">
+                <a14:hiddenLine xmlns="" xmlns:a14="http://schemas.microsoft.com/office/drawing/2010/main" w="9525">
                   <a:solidFill>
                     <a:srgbClr val="000000"/>
                   </a:solidFill>
@@ -4055,7 +4222,7 @@
             </a:ln>
             <a:extLst>
               <a:ext uri="{91240B29-F687-4f45-9708-019B960494DF}">
-                <a14:hiddenLine xmlns:a14="http://schemas.microsoft.com/office/drawing/2010/main" xmlns="" w="9525">
+                <a14:hiddenLine xmlns="" xmlns:a14="http://schemas.microsoft.com/office/drawing/2010/main" w="9525">
                   <a:solidFill>
                     <a:srgbClr val="000000"/>
                   </a:solidFill>
@@ -4120,7 +4287,7 @@
             </a:ln>
             <a:extLst>
               <a:ext uri="{91240B29-F687-4f45-9708-019B960494DF}">
-                <a14:hiddenLine xmlns:a14="http://schemas.microsoft.com/office/drawing/2010/main" xmlns="" w="9525">
+                <a14:hiddenLine xmlns="" xmlns:a14="http://schemas.microsoft.com/office/drawing/2010/main" w="9525">
                   <a:solidFill>
                     <a:srgbClr val="000000"/>
                   </a:solidFill>
@@ -4182,7 +4349,7 @@
             </a:ln>
             <a:extLst>
               <a:ext uri="{91240B29-F687-4f45-9708-019B960494DF}">
-                <a14:hiddenLine xmlns:a14="http://schemas.microsoft.com/office/drawing/2010/main" xmlns="" w="9525">
+                <a14:hiddenLine xmlns="" xmlns:a14="http://schemas.microsoft.com/office/drawing/2010/main" w="9525">
                   <a:solidFill>
                     <a:srgbClr val="000000"/>
                   </a:solidFill>
@@ -4272,7 +4439,7 @@
             </a:ln>
             <a:extLst>
               <a:ext uri="{91240B29-F687-4f45-9708-019B960494DF}">
-                <a14:hiddenLine xmlns:a14="http://schemas.microsoft.com/office/drawing/2010/main" xmlns="" w="9525">
+                <a14:hiddenLine xmlns="" xmlns:a14="http://schemas.microsoft.com/office/drawing/2010/main" w="9525">
                   <a:solidFill>
                     <a:srgbClr val="000000"/>
                   </a:solidFill>
@@ -4362,7 +4529,7 @@
             </a:ln>
             <a:extLst>
               <a:ext uri="{91240B29-F687-4f45-9708-019B960494DF}">
-                <a14:hiddenLine xmlns:a14="http://schemas.microsoft.com/office/drawing/2010/main" xmlns="" w="9525">
+                <a14:hiddenLine xmlns="" xmlns:a14="http://schemas.microsoft.com/office/drawing/2010/main" w="9525">
                   <a:solidFill>
                     <a:srgbClr val="000000"/>
                   </a:solidFill>
@@ -4424,7 +4591,7 @@
             </a:ln>
             <a:extLst>
               <a:ext uri="{91240B29-F687-4f45-9708-019B960494DF}">
-                <a14:hiddenLine xmlns:a14="http://schemas.microsoft.com/office/drawing/2010/main" xmlns="" w="9525">
+                <a14:hiddenLine xmlns="" xmlns:a14="http://schemas.microsoft.com/office/drawing/2010/main" w="9525">
                   <a:solidFill>
                     <a:srgbClr val="000000"/>
                   </a:solidFill>
@@ -4544,7 +4711,7 @@
             </a:ln>
             <a:extLst>
               <a:ext uri="{91240B29-F687-4f45-9708-019B960494DF}">
-                <a14:hiddenLine xmlns:a14="http://schemas.microsoft.com/office/drawing/2010/main" xmlns="" w="9525">
+                <a14:hiddenLine xmlns="" xmlns:a14="http://schemas.microsoft.com/office/drawing/2010/main" w="9525">
                   <a:solidFill>
                     <a:srgbClr val="000000"/>
                   </a:solidFill>
@@ -4612,7 +4779,7 @@
             </a:ln>
             <a:extLst>
               <a:ext uri="{91240B29-F687-4f45-9708-019B960494DF}">
-                <a14:hiddenLine xmlns:a14="http://schemas.microsoft.com/office/drawing/2010/main" xmlns="" w="9525">
+                <a14:hiddenLine xmlns="" xmlns:a14="http://schemas.microsoft.com/office/drawing/2010/main" w="9525">
                   <a:solidFill>
                     <a:srgbClr val="000000"/>
                   </a:solidFill>
@@ -4702,7 +4869,7 @@
             </a:ln>
             <a:extLst>
               <a:ext uri="{91240B29-F687-4f45-9708-019B960494DF}">
-                <a14:hiddenLine xmlns:a14="http://schemas.microsoft.com/office/drawing/2010/main" xmlns="" w="9525">
+                <a14:hiddenLine xmlns="" xmlns:a14="http://schemas.microsoft.com/office/drawing/2010/main" w="9525">
                   <a:solidFill>
                     <a:srgbClr val="000000"/>
                   </a:solidFill>
@@ -4842,7 +5009,7 @@
           <a:p>
             <a:fld id="{918D0A13-DF37-433A-BA23-15E0908055D8}" type="datetimeFigureOut">
               <a:rPr lang="en-US" smtClean="0"/>
-              <a:t>12-Mar-17</a:t>
+              <a:t>14-Mar-17</a:t>
             </a:fld>
             <a:endParaRPr lang="en-US"/>
           </a:p>
@@ -5109,7 +5276,7 @@
           <a:p>
             <a:fld id="{918D0A13-DF37-433A-BA23-15E0908055D8}" type="datetimeFigureOut">
               <a:rPr lang="en-US" smtClean="0"/>
-              <a:t>12-Mar-17</a:t>
+              <a:t>14-Mar-17</a:t>
             </a:fld>
             <a:endParaRPr lang="en-US"/>
           </a:p>
@@ -5305,7 +5472,7 @@
           <a:p>
             <a:fld id="{918D0A13-DF37-433A-BA23-15E0908055D8}" type="datetimeFigureOut">
               <a:rPr lang="en-US" smtClean="0"/>
-              <a:t>12-Mar-17</a:t>
+              <a:t>14-Mar-17</a:t>
             </a:fld>
             <a:endParaRPr lang="en-US"/>
           </a:p>
@@ -5568,7 +5735,7 @@
           <a:p>
             <a:fld id="{918D0A13-DF37-433A-BA23-15E0908055D8}" type="datetimeFigureOut">
               <a:rPr lang="en-US" smtClean="0"/>
-              <a:t>12-Mar-17</a:t>
+              <a:t>14-Mar-17</a:t>
             </a:fld>
             <a:endParaRPr lang="en-US"/>
           </a:p>
@@ -6002,7 +6169,7 @@
           <a:p>
             <a:fld id="{918D0A13-DF37-433A-BA23-15E0908055D8}" type="datetimeFigureOut">
               <a:rPr lang="en-US" smtClean="0"/>
-              <a:t>12-Mar-17</a:t>
+              <a:t>14-Mar-17</a:t>
             </a:fld>
             <a:endParaRPr lang="en-US"/>
           </a:p>
@@ -6548,7 +6715,7 @@
           <a:p>
             <a:fld id="{918D0A13-DF37-433A-BA23-15E0908055D8}" type="datetimeFigureOut">
               <a:rPr lang="en-US" smtClean="0"/>
-              <a:t>12-Mar-17</a:t>
+              <a:t>14-Mar-17</a:t>
             </a:fld>
             <a:endParaRPr lang="en-US"/>
           </a:p>
@@ -7268,7 +7435,7 @@
           <a:p>
             <a:fld id="{918D0A13-DF37-433A-BA23-15E0908055D8}" type="datetimeFigureOut">
               <a:rPr lang="en-US" smtClean="0"/>
-              <a:t>12-Mar-17</a:t>
+              <a:t>14-Mar-17</a:t>
             </a:fld>
             <a:endParaRPr lang="en-US"/>
           </a:p>
@@ -7438,7 +7605,7 @@
           <a:p>
             <a:fld id="{918D0A13-DF37-433A-BA23-15E0908055D8}" type="datetimeFigureOut">
               <a:rPr lang="en-US" smtClean="0"/>
-              <a:t>12-Mar-17</a:t>
+              <a:t>14-Mar-17</a:t>
             </a:fld>
             <a:endParaRPr lang="en-US"/>
           </a:p>
@@ -7618,7 +7785,7 @@
           <a:p>
             <a:fld id="{918D0A13-DF37-433A-BA23-15E0908055D8}" type="datetimeFigureOut">
               <a:rPr lang="en-US" smtClean="0"/>
-              <a:t>12-Mar-17</a:t>
+              <a:t>14-Mar-17</a:t>
             </a:fld>
             <a:endParaRPr lang="en-US"/>
           </a:p>
@@ -7788,7 +7955,7 @@
           <a:p>
             <a:fld id="{918D0A13-DF37-433A-BA23-15E0908055D8}" type="datetimeFigureOut">
               <a:rPr lang="en-US" smtClean="0"/>
-              <a:t>12-Mar-17</a:t>
+              <a:t>14-Mar-17</a:t>
             </a:fld>
             <a:endParaRPr lang="en-US"/>
           </a:p>
@@ -8038,7 +8205,7 @@
           <a:p>
             <a:fld id="{918D0A13-DF37-433A-BA23-15E0908055D8}" type="datetimeFigureOut">
               <a:rPr lang="en-US" smtClean="0"/>
-              <a:t>12-Mar-17</a:t>
+              <a:t>14-Mar-17</a:t>
             </a:fld>
             <a:endParaRPr lang="en-US"/>
           </a:p>
@@ -8270,7 +8437,7 @@
           <a:p>
             <a:fld id="{918D0A13-DF37-433A-BA23-15E0908055D8}" type="datetimeFigureOut">
               <a:rPr lang="en-US" smtClean="0"/>
-              <a:t>12-Mar-17</a:t>
+              <a:t>14-Mar-17</a:t>
             </a:fld>
             <a:endParaRPr lang="en-US"/>
           </a:p>
@@ -8651,7 +8818,7 @@
           <a:p>
             <a:fld id="{918D0A13-DF37-433A-BA23-15E0908055D8}" type="datetimeFigureOut">
               <a:rPr lang="en-US" smtClean="0"/>
-              <a:t>12-Mar-17</a:t>
+              <a:t>14-Mar-17</a:t>
             </a:fld>
             <a:endParaRPr lang="en-US"/>
           </a:p>
@@ -8769,7 +8936,7 @@
           <a:p>
             <a:fld id="{918D0A13-DF37-433A-BA23-15E0908055D8}" type="datetimeFigureOut">
               <a:rPr lang="en-US" smtClean="0"/>
-              <a:t>12-Mar-17</a:t>
+              <a:t>14-Mar-17</a:t>
             </a:fld>
             <a:endParaRPr lang="en-US"/>
           </a:p>
@@ -8864,7 +9031,7 @@
           <a:p>
             <a:fld id="{918D0A13-DF37-433A-BA23-15E0908055D8}" type="datetimeFigureOut">
               <a:rPr lang="en-US" smtClean="0"/>
-              <a:t>12-Mar-17</a:t>
+              <a:t>14-Mar-17</a:t>
             </a:fld>
             <a:endParaRPr lang="en-US"/>
           </a:p>
@@ -9113,7 +9280,7 @@
           <a:p>
             <a:fld id="{918D0A13-DF37-433A-BA23-15E0908055D8}" type="datetimeFigureOut">
               <a:rPr lang="en-US" smtClean="0"/>
-              <a:t>12-Mar-17</a:t>
+              <a:t>14-Mar-17</a:t>
             </a:fld>
             <a:endParaRPr lang="en-US"/>
           </a:p>
@@ -9393,7 +9560,7 @@
           <a:p>
             <a:fld id="{918D0A13-DF37-433A-BA23-15E0908055D8}" type="datetimeFigureOut">
               <a:rPr lang="en-US" smtClean="0"/>
-              <a:t>12-Mar-17</a:t>
+              <a:t>14-Mar-17</a:t>
             </a:fld>
             <a:endParaRPr lang="en-US"/>
           </a:p>
@@ -9509,7 +9676,7 @@
           <a:noFill/>
           <a:extLst>
             <a:ext uri="{909E8E84-426E-40dd-AFC4-6F175D3DCCD1}">
-              <a14:hiddenFill xmlns:a14="http://schemas.microsoft.com/office/drawing/2010/main" xmlns="">
+              <a14:hiddenFill xmlns="" xmlns:a14="http://schemas.microsoft.com/office/drawing/2010/main">
                 <a:solidFill>
                   <a:srgbClr val="FFFFFF"/>
                 </a:solidFill>
@@ -9583,7 +9750,7 @@
               </a:ln>
               <a:extLst>
                 <a:ext uri="{91240B29-F687-4f45-9708-019B960494DF}">
-                  <a14:hiddenLine xmlns:a14="http://schemas.microsoft.com/office/drawing/2010/main" xmlns="" w="9525">
+                  <a14:hiddenLine xmlns="" xmlns:a14="http://schemas.microsoft.com/office/drawing/2010/main" w="9525">
                     <a:solidFill>
                       <a:srgbClr val="000000"/>
                     </a:solidFill>
@@ -9673,7 +9840,7 @@
               </a:ln>
               <a:extLst>
                 <a:ext uri="{91240B29-F687-4f45-9708-019B960494DF}">
-                  <a14:hiddenLine xmlns:a14="http://schemas.microsoft.com/office/drawing/2010/main" xmlns="" w="9525">
+                  <a14:hiddenLine xmlns="" xmlns:a14="http://schemas.microsoft.com/office/drawing/2010/main" w="9525">
                     <a:solidFill>
                       <a:srgbClr val="000000"/>
                     </a:solidFill>
@@ -9763,7 +9930,7 @@
               </a:ln>
               <a:extLst>
                 <a:ext uri="{91240B29-F687-4f45-9708-019B960494DF}">
-                  <a14:hiddenLine xmlns:a14="http://schemas.microsoft.com/office/drawing/2010/main" xmlns="" w="9525">
+                  <a14:hiddenLine xmlns="" xmlns:a14="http://schemas.microsoft.com/office/drawing/2010/main" w="9525">
                     <a:solidFill>
                       <a:srgbClr val="000000"/>
                     </a:solidFill>
@@ -9825,7 +9992,7 @@
               </a:ln>
               <a:extLst>
                 <a:ext uri="{91240B29-F687-4f45-9708-019B960494DF}">
-                  <a14:hiddenLine xmlns:a14="http://schemas.microsoft.com/office/drawing/2010/main" xmlns="" w="9525">
+                  <a14:hiddenLine xmlns="" xmlns:a14="http://schemas.microsoft.com/office/drawing/2010/main" w="9525">
                     <a:solidFill>
                       <a:srgbClr val="000000"/>
                     </a:solidFill>
@@ -9915,7 +10082,7 @@
               </a:ln>
               <a:extLst>
                 <a:ext uri="{91240B29-F687-4f45-9708-019B960494DF}">
-                  <a14:hiddenLine xmlns:a14="http://schemas.microsoft.com/office/drawing/2010/main" xmlns="" w="9525">
+                  <a14:hiddenLine xmlns="" xmlns:a14="http://schemas.microsoft.com/office/drawing/2010/main" w="9525">
                     <a:solidFill>
                       <a:srgbClr val="000000"/>
                     </a:solidFill>
@@ -9977,7 +10144,7 @@
               </a:ln>
               <a:extLst>
                 <a:ext uri="{91240B29-F687-4f45-9708-019B960494DF}">
-                  <a14:hiddenLine xmlns:a14="http://schemas.microsoft.com/office/drawing/2010/main" xmlns="" w="9525">
+                  <a14:hiddenLine xmlns="" xmlns:a14="http://schemas.microsoft.com/office/drawing/2010/main" w="9525">
                     <a:solidFill>
                       <a:srgbClr val="000000"/>
                     </a:solidFill>
@@ -10039,7 +10206,7 @@
               </a:ln>
               <a:extLst>
                 <a:ext uri="{91240B29-F687-4f45-9708-019B960494DF}">
-                  <a14:hiddenLine xmlns:a14="http://schemas.microsoft.com/office/drawing/2010/main" xmlns="" w="9525">
+                  <a14:hiddenLine xmlns="" xmlns:a14="http://schemas.microsoft.com/office/drawing/2010/main" w="9525">
                     <a:solidFill>
                       <a:srgbClr val="000000"/>
                     </a:solidFill>
@@ -10129,7 +10296,7 @@
               </a:ln>
               <a:extLst>
                 <a:ext uri="{91240B29-F687-4f45-9708-019B960494DF}">
-                  <a14:hiddenLine xmlns:a14="http://schemas.microsoft.com/office/drawing/2010/main" xmlns="" w="9525">
+                  <a14:hiddenLine xmlns="" xmlns:a14="http://schemas.microsoft.com/office/drawing/2010/main" w="9525">
                     <a:solidFill>
                       <a:srgbClr val="000000"/>
                     </a:solidFill>
@@ -10219,7 +10386,7 @@
               </a:ln>
               <a:extLst>
                 <a:ext uri="{91240B29-F687-4f45-9708-019B960494DF}">
-                  <a14:hiddenLine xmlns:a14="http://schemas.microsoft.com/office/drawing/2010/main" xmlns="" w="9525">
+                  <a14:hiddenLine xmlns="" xmlns:a14="http://schemas.microsoft.com/office/drawing/2010/main" w="9525">
                     <a:solidFill>
                       <a:srgbClr val="000000"/>
                     </a:solidFill>
@@ -10281,7 +10448,7 @@
               </a:ln>
               <a:extLst>
                 <a:ext uri="{91240B29-F687-4f45-9708-019B960494DF}">
-                  <a14:hiddenLine xmlns:a14="http://schemas.microsoft.com/office/drawing/2010/main" xmlns="" w="9525">
+                  <a14:hiddenLine xmlns="" xmlns:a14="http://schemas.microsoft.com/office/drawing/2010/main" w="9525">
                     <a:solidFill>
                       <a:srgbClr val="000000"/>
                     </a:solidFill>
@@ -10391,7 +10558,7 @@
               </a:ln>
               <a:extLst>
                 <a:ext uri="{91240B29-F687-4f45-9708-019B960494DF}">
-                  <a14:hiddenLine xmlns:a14="http://schemas.microsoft.com/office/drawing/2010/main" xmlns="" w="9525">
+                  <a14:hiddenLine xmlns="" xmlns:a14="http://schemas.microsoft.com/office/drawing/2010/main" w="9525">
                     <a:solidFill>
                       <a:srgbClr val="000000"/>
                     </a:solidFill>
@@ -10475,7 +10642,7 @@
               </a:ln>
               <a:extLst>
                 <a:ext uri="{91240B29-F687-4f45-9708-019B960494DF}">
-                  <a14:hiddenLine xmlns:a14="http://schemas.microsoft.com/office/drawing/2010/main" xmlns="" w="9525">
+                  <a14:hiddenLine xmlns="" xmlns:a14="http://schemas.microsoft.com/office/drawing/2010/main" w="9525">
                     <a:solidFill>
                       <a:srgbClr val="000000"/>
                     </a:solidFill>
@@ -10537,7 +10704,7 @@
               </a:ln>
               <a:extLst>
                 <a:ext uri="{91240B29-F687-4f45-9708-019B960494DF}">
-                  <a14:hiddenLine xmlns:a14="http://schemas.microsoft.com/office/drawing/2010/main" xmlns="" w="9525">
+                  <a14:hiddenLine xmlns="" xmlns:a14="http://schemas.microsoft.com/office/drawing/2010/main" w="9525">
                     <a:solidFill>
                       <a:srgbClr val="000000"/>
                     </a:solidFill>
@@ -10599,7 +10766,7 @@
               </a:ln>
               <a:extLst>
                 <a:ext uri="{91240B29-F687-4f45-9708-019B960494DF}">
-                  <a14:hiddenLine xmlns:a14="http://schemas.microsoft.com/office/drawing/2010/main" xmlns="" w="9525">
+                  <a14:hiddenLine xmlns="" xmlns:a14="http://schemas.microsoft.com/office/drawing/2010/main" w="9525">
                     <a:solidFill>
                       <a:srgbClr val="000000"/>
                     </a:solidFill>
@@ -10689,7 +10856,7 @@
               </a:ln>
               <a:extLst>
                 <a:ext uri="{91240B29-F687-4f45-9708-019B960494DF}">
-                  <a14:hiddenLine xmlns:a14="http://schemas.microsoft.com/office/drawing/2010/main" xmlns="" w="9525">
+                  <a14:hiddenLine xmlns="" xmlns:a14="http://schemas.microsoft.com/office/drawing/2010/main" w="9525">
                     <a:solidFill>
                       <a:srgbClr val="000000"/>
                     </a:solidFill>
@@ -10723,7 +10890,7 @@
               </a:ln>
               <a:extLst>
                 <a:ext uri="{91240B29-F687-4f45-9708-019B960494DF}">
-                  <a14:hiddenLine xmlns:a14="http://schemas.microsoft.com/office/drawing/2010/main" xmlns="" w="9525">
+                  <a14:hiddenLine xmlns="" xmlns:a14="http://schemas.microsoft.com/office/drawing/2010/main" w="9525">
                     <a:solidFill>
                       <a:srgbClr val="000000"/>
                     </a:solidFill>
@@ -10788,7 +10955,7 @@
               </a:ln>
               <a:extLst>
                 <a:ext uri="{91240B29-F687-4f45-9708-019B960494DF}">
-                  <a14:hiddenLine xmlns:a14="http://schemas.microsoft.com/office/drawing/2010/main" xmlns="" w="9525">
+                  <a14:hiddenLine xmlns="" xmlns:a14="http://schemas.microsoft.com/office/drawing/2010/main" w="9525">
                     <a:solidFill>
                       <a:srgbClr val="000000"/>
                     </a:solidFill>
@@ -10878,7 +11045,7 @@
               </a:ln>
               <a:extLst>
                 <a:ext uri="{91240B29-F687-4f45-9708-019B960494DF}">
-                  <a14:hiddenLine xmlns:a14="http://schemas.microsoft.com/office/drawing/2010/main" xmlns="" w="9525">
+                  <a14:hiddenLine xmlns="" xmlns:a14="http://schemas.microsoft.com/office/drawing/2010/main" w="9525">
                     <a:solidFill>
                       <a:srgbClr val="000000"/>
                     </a:solidFill>
@@ -10940,7 +11107,7 @@
               </a:ln>
               <a:extLst>
                 <a:ext uri="{91240B29-F687-4f45-9708-019B960494DF}">
-                  <a14:hiddenLine xmlns:a14="http://schemas.microsoft.com/office/drawing/2010/main" xmlns="" w="9525">
+                  <a14:hiddenLine xmlns="" xmlns:a14="http://schemas.microsoft.com/office/drawing/2010/main" w="9525">
                     <a:solidFill>
                       <a:srgbClr val="000000"/>
                     </a:solidFill>
@@ -11030,7 +11197,7 @@
               </a:ln>
               <a:extLst>
                 <a:ext uri="{91240B29-F687-4f45-9708-019B960494DF}">
-                  <a14:hiddenLine xmlns:a14="http://schemas.microsoft.com/office/drawing/2010/main" xmlns="" w="9525">
+                  <a14:hiddenLine xmlns="" xmlns:a14="http://schemas.microsoft.com/office/drawing/2010/main" w="9525">
                     <a:solidFill>
                       <a:srgbClr val="000000"/>
                     </a:solidFill>
@@ -11095,7 +11262,7 @@
               </a:ln>
               <a:extLst>
                 <a:ext uri="{91240B29-F687-4f45-9708-019B960494DF}">
-                  <a14:hiddenLine xmlns:a14="http://schemas.microsoft.com/office/drawing/2010/main" xmlns="" w="9525">
+                  <a14:hiddenLine xmlns="" xmlns:a14="http://schemas.microsoft.com/office/drawing/2010/main" w="9525">
                     <a:solidFill>
                       <a:srgbClr val="000000"/>
                     </a:solidFill>
@@ -11157,7 +11324,7 @@
               </a:ln>
               <a:extLst>
                 <a:ext uri="{91240B29-F687-4f45-9708-019B960494DF}">
-                  <a14:hiddenLine xmlns:a14="http://schemas.microsoft.com/office/drawing/2010/main" xmlns="" w="9525">
+                  <a14:hiddenLine xmlns="" xmlns:a14="http://schemas.microsoft.com/office/drawing/2010/main" w="9525">
                     <a:solidFill>
                       <a:srgbClr val="000000"/>
                     </a:solidFill>
@@ -11247,7 +11414,7 @@
               </a:ln>
               <a:extLst>
                 <a:ext uri="{91240B29-F687-4f45-9708-019B960494DF}">
-                  <a14:hiddenLine xmlns:a14="http://schemas.microsoft.com/office/drawing/2010/main" xmlns="" w="9525">
+                  <a14:hiddenLine xmlns="" xmlns:a14="http://schemas.microsoft.com/office/drawing/2010/main" w="9525">
                     <a:solidFill>
                       <a:srgbClr val="000000"/>
                     </a:solidFill>
@@ -11337,7 +11504,7 @@
               </a:ln>
               <a:extLst>
                 <a:ext uri="{91240B29-F687-4f45-9708-019B960494DF}">
-                  <a14:hiddenLine xmlns:a14="http://schemas.microsoft.com/office/drawing/2010/main" xmlns="" w="9525">
+                  <a14:hiddenLine xmlns="" xmlns:a14="http://schemas.microsoft.com/office/drawing/2010/main" w="9525">
                     <a:solidFill>
                       <a:srgbClr val="000000"/>
                     </a:solidFill>
@@ -11402,7 +11569,7 @@
               </a:ln>
               <a:extLst>
                 <a:ext uri="{91240B29-F687-4f45-9708-019B960494DF}">
-                  <a14:hiddenLine xmlns:a14="http://schemas.microsoft.com/office/drawing/2010/main" xmlns="" w="9525">
+                  <a14:hiddenLine xmlns="" xmlns:a14="http://schemas.microsoft.com/office/drawing/2010/main" w="9525">
                     <a:solidFill>
                       <a:srgbClr val="000000"/>
                     </a:solidFill>
@@ -11522,7 +11689,7 @@
               </a:ln>
               <a:extLst>
                 <a:ext uri="{91240B29-F687-4f45-9708-019B960494DF}">
-                  <a14:hiddenLine xmlns:a14="http://schemas.microsoft.com/office/drawing/2010/main" xmlns="" w="9525">
+                  <a14:hiddenLine xmlns="" xmlns:a14="http://schemas.microsoft.com/office/drawing/2010/main" w="9525">
                     <a:solidFill>
                       <a:srgbClr val="000000"/>
                     </a:solidFill>
@@ -11620,7 +11787,7 @@
               </a:ln>
               <a:extLst>
                 <a:ext uri="{91240B29-F687-4f45-9708-019B960494DF}">
-                  <a14:hiddenLine xmlns:a14="http://schemas.microsoft.com/office/drawing/2010/main" xmlns="" w="9525">
+                  <a14:hiddenLine xmlns="" xmlns:a14="http://schemas.microsoft.com/office/drawing/2010/main" w="9525">
                     <a:solidFill>
                       <a:srgbClr val="000000"/>
                     </a:solidFill>
@@ -11735,7 +11902,7 @@
               </a:ln>
               <a:extLst>
                 <a:ext uri="{91240B29-F687-4f45-9708-019B960494DF}">
-                  <a14:hiddenLine xmlns:a14="http://schemas.microsoft.com/office/drawing/2010/main" xmlns="" w="9525">
+                  <a14:hiddenLine xmlns="" xmlns:a14="http://schemas.microsoft.com/office/drawing/2010/main" w="9525">
                     <a:solidFill>
                       <a:srgbClr val="000000"/>
                     </a:solidFill>
@@ -11825,7 +11992,7 @@
               </a:ln>
               <a:extLst>
                 <a:ext uri="{91240B29-F687-4f45-9708-019B960494DF}">
-                  <a14:hiddenLine xmlns:a14="http://schemas.microsoft.com/office/drawing/2010/main" xmlns="" w="9525">
+                  <a14:hiddenLine xmlns="" xmlns:a14="http://schemas.microsoft.com/office/drawing/2010/main" w="9525">
                     <a:solidFill>
                       <a:srgbClr val="000000"/>
                     </a:solidFill>
@@ -11890,7 +12057,7 @@
               </a:ln>
               <a:extLst>
                 <a:ext uri="{91240B29-F687-4f45-9708-019B960494DF}">
-                  <a14:hiddenLine xmlns:a14="http://schemas.microsoft.com/office/drawing/2010/main" xmlns="" w="9525">
+                  <a14:hiddenLine xmlns="" xmlns:a14="http://schemas.microsoft.com/office/drawing/2010/main" w="9525">
                     <a:solidFill>
                       <a:srgbClr val="000000"/>
                     </a:solidFill>
@@ -11980,7 +12147,7 @@
               </a:ln>
               <a:extLst>
                 <a:ext uri="{91240B29-F687-4f45-9708-019B960494DF}">
-                  <a14:hiddenLine xmlns:a14="http://schemas.microsoft.com/office/drawing/2010/main" xmlns="" w="9525">
+                  <a14:hiddenLine xmlns="" xmlns:a14="http://schemas.microsoft.com/office/drawing/2010/main" w="9525">
                     <a:solidFill>
                       <a:srgbClr val="000000"/>
                     </a:solidFill>
@@ -12048,7 +12215,7 @@
               </a:ln>
               <a:extLst>
                 <a:ext uri="{91240B29-F687-4f45-9708-019B960494DF}">
-                  <a14:hiddenLine xmlns:a14="http://schemas.microsoft.com/office/drawing/2010/main" xmlns="" w="9525">
+                  <a14:hiddenLine xmlns="" xmlns:a14="http://schemas.microsoft.com/office/drawing/2010/main" w="9525">
                     <a:solidFill>
                       <a:srgbClr val="000000"/>
                     </a:solidFill>
@@ -12138,7 +12305,7 @@
               </a:ln>
               <a:extLst>
                 <a:ext uri="{91240B29-F687-4f45-9708-019B960494DF}">
-                  <a14:hiddenLine xmlns:a14="http://schemas.microsoft.com/office/drawing/2010/main" xmlns="" w="9525">
+                  <a14:hiddenLine xmlns="" xmlns:a14="http://schemas.microsoft.com/office/drawing/2010/main" w="9525">
                     <a:solidFill>
                       <a:srgbClr val="000000"/>
                     </a:solidFill>
@@ -12206,7 +12373,7 @@
               </a:ln>
               <a:extLst>
                 <a:ext uri="{91240B29-F687-4f45-9708-019B960494DF}">
-                  <a14:hiddenLine xmlns:a14="http://schemas.microsoft.com/office/drawing/2010/main" xmlns="" w="9525">
+                  <a14:hiddenLine xmlns="" xmlns:a14="http://schemas.microsoft.com/office/drawing/2010/main" w="9525">
                     <a:solidFill>
                       <a:srgbClr val="000000"/>
                     </a:solidFill>
@@ -12296,7 +12463,7 @@
               </a:ln>
               <a:extLst>
                 <a:ext uri="{91240B29-F687-4f45-9708-019B960494DF}">
-                  <a14:hiddenLine xmlns:a14="http://schemas.microsoft.com/office/drawing/2010/main" xmlns="" w="9525">
+                  <a14:hiddenLine xmlns="" xmlns:a14="http://schemas.microsoft.com/office/drawing/2010/main" w="9525">
                     <a:solidFill>
                       <a:srgbClr val="000000"/>
                     </a:solidFill>
@@ -12330,7 +12497,7 @@
               </a:ln>
               <a:extLst>
                 <a:ext uri="{91240B29-F687-4f45-9708-019B960494DF}">
-                  <a14:hiddenLine xmlns:a14="http://schemas.microsoft.com/office/drawing/2010/main" xmlns="" w="9525">
+                  <a14:hiddenLine xmlns="" xmlns:a14="http://schemas.microsoft.com/office/drawing/2010/main" w="9525">
                     <a:solidFill>
                       <a:srgbClr val="000000"/>
                     </a:solidFill>
@@ -12470,7 +12637,7 @@
           <a:p>
             <a:fld id="{918D0A13-DF37-433A-BA23-15E0908055D8}" type="datetimeFigureOut">
               <a:rPr lang="en-US" smtClean="0"/>
-              <a:t>12-Mar-17</a:t>
+              <a:t>14-Mar-17</a:t>
             </a:fld>
             <a:endParaRPr lang="en-US"/>
           </a:p>
@@ -13782,7 +13949,7 @@
                   <a:schemeClr val="tx1"/>
                 </a:solidFill>
                 <a:latin typeface="Maiandra GD" panose="020E0502030308020204" pitchFamily="34" charset="0"/>
-                <a:hlinkClick r:id="rId2"/>
+                <a:hlinkClick r:id="rId3"/>
               </a:rPr>
               <a:t>entities</a:t>
             </a:r>

</xml_diff>